<commit_message>
[cpp] Update cv5 slides
</commit_message>
<xml_diff>
--- a/data/2018-19/cpp/cv5/cpp_cv5.pptx
+++ b/data/2018-19/cpp/cv5/cpp_cv5.pptx
@@ -106,6 +106,11 @@
       </a:defRPr>
     </a:lvl9pPr>
   </p:defaultTextStyle>
+  <p:extLst>
+    <p:ext uri="{EFAFB233-063F-42B5-8137-9DF3F51BA10A}">
+      <p15:sldGuideLst xmlns:p15="http://schemas.microsoft.com/office/powerpoint/2012/main"/>
+    </p:ext>
+  </p:extLst>
 </p:presentation>
 </file>
 
@@ -298,7 +303,7 @@
             <a:fld id="{B61BEF0D-F0BB-DE4B-95CE-6DB70DBA9567}" type="datetimeFigureOut">
               <a:rPr lang="en-US" dirty="0"/>
               <a:pPr/>
-              <a:t>10/29/2018</a:t>
+              <a:t>11/2/2018</a:t>
             </a:fld>
             <a:endParaRPr lang="en-US" dirty="0"/>
           </a:p>
@@ -633,7 +638,7 @@
             <a:fld id="{B61BEF0D-F0BB-DE4B-95CE-6DB70DBA9567}" type="datetimeFigureOut">
               <a:rPr lang="en-US" dirty="0"/>
               <a:pPr/>
-              <a:t>10/29/2018</a:t>
+              <a:t>11/2/2018</a:t>
             </a:fld>
             <a:endParaRPr lang="en-US" dirty="0"/>
           </a:p>
@@ -1031,7 +1036,7 @@
             <a:fld id="{B61BEF0D-F0BB-DE4B-95CE-6DB70DBA9567}" type="datetimeFigureOut">
               <a:rPr lang="en-US" dirty="0"/>
               <a:pPr/>
-              <a:t>10/29/2018</a:t>
+              <a:t>11/2/2018</a:t>
             </a:fld>
             <a:endParaRPr lang="en-US" dirty="0"/>
           </a:p>
@@ -1364,7 +1369,7 @@
             <a:fld id="{B61BEF0D-F0BB-DE4B-95CE-6DB70DBA9567}" type="datetimeFigureOut">
               <a:rPr lang="en-US" dirty="0"/>
               <a:pPr/>
-              <a:t>10/29/2018</a:t>
+              <a:t>11/2/2018</a:t>
             </a:fld>
             <a:endParaRPr lang="en-US" dirty="0"/>
           </a:p>
@@ -1681,7 +1686,7 @@
             <a:fld id="{B61BEF0D-F0BB-DE4B-95CE-6DB70DBA9567}" type="datetimeFigureOut">
               <a:rPr lang="en-US" dirty="0"/>
               <a:pPr/>
-              <a:t>10/29/2018</a:t>
+              <a:t>11/2/2018</a:t>
             </a:fld>
             <a:endParaRPr lang="en-US" dirty="0"/>
           </a:p>
@@ -2074,7 +2079,7 @@
             <a:fld id="{B61BEF0D-F0BB-DE4B-95CE-6DB70DBA9567}" type="datetimeFigureOut">
               <a:rPr lang="en-US" dirty="0"/>
               <a:pPr/>
-              <a:t>10/29/2018</a:t>
+              <a:t>11/2/2018</a:t>
             </a:fld>
             <a:endParaRPr lang="en-US" dirty="0"/>
           </a:p>
@@ -2328,7 +2333,7 @@
             <a:fld id="{B61BEF0D-F0BB-DE4B-95CE-6DB70DBA9567}" type="datetimeFigureOut">
               <a:rPr lang="en-US" dirty="0"/>
               <a:pPr/>
-              <a:t>10/29/2018</a:t>
+              <a:t>11/2/2018</a:t>
             </a:fld>
             <a:endParaRPr lang="en-US" dirty="0"/>
           </a:p>
@@ -2587,7 +2592,7 @@
             <a:fld id="{B61BEF0D-F0BB-DE4B-95CE-6DB70DBA9567}" type="datetimeFigureOut">
               <a:rPr lang="en-US" dirty="0"/>
               <a:pPr/>
-              <a:t>10/29/2018</a:t>
+              <a:t>11/2/2018</a:t>
             </a:fld>
             <a:endParaRPr lang="en-US" dirty="0"/>
           </a:p>
@@ -2846,7 +2851,7 @@
             <a:fld id="{B61BEF0D-F0BB-DE4B-95CE-6DB70DBA9567}" type="datetimeFigureOut">
               <a:rPr lang="en-US" dirty="0"/>
               <a:pPr/>
-              <a:t>10/29/2018</a:t>
+              <a:t>11/2/2018</a:t>
             </a:fld>
             <a:endParaRPr lang="en-US" dirty="0"/>
           </a:p>
@@ -3172,7 +3177,7 @@
             <a:fld id="{B61BEF0D-F0BB-DE4B-95CE-6DB70DBA9567}" type="datetimeFigureOut">
               <a:rPr lang="en-US" dirty="0"/>
               <a:pPr/>
-              <a:t>10/29/2018</a:t>
+              <a:t>11/2/2018</a:t>
             </a:fld>
             <a:endParaRPr lang="en-US" dirty="0"/>
           </a:p>
@@ -3492,7 +3497,7 @@
             <a:fld id="{B61BEF0D-F0BB-DE4B-95CE-6DB70DBA9567}" type="datetimeFigureOut">
               <a:rPr lang="en-US" dirty="0"/>
               <a:pPr/>
-              <a:t>10/29/2018</a:t>
+              <a:t>11/2/2018</a:t>
             </a:fld>
             <a:endParaRPr lang="en-US" dirty="0"/>
           </a:p>
@@ -3946,7 +3951,7 @@
             <a:fld id="{B61BEF0D-F0BB-DE4B-95CE-6DB70DBA9567}" type="datetimeFigureOut">
               <a:rPr lang="en-US" dirty="0"/>
               <a:pPr/>
-              <a:t>10/29/2018</a:t>
+              <a:t>11/2/2018</a:t>
             </a:fld>
             <a:endParaRPr lang="en-US" dirty="0"/>
           </a:p>
@@ -4148,7 +4153,7 @@
             <a:fld id="{B61BEF0D-F0BB-DE4B-95CE-6DB70DBA9567}" type="datetimeFigureOut">
               <a:rPr lang="en-US" dirty="0"/>
               <a:pPr/>
-              <a:t>10/29/2018</a:t>
+              <a:t>11/2/2018</a:t>
             </a:fld>
             <a:endParaRPr lang="en-US" dirty="0"/>
           </a:p>
@@ -4322,7 +4327,7 @@
             <a:fld id="{B61BEF0D-F0BB-DE4B-95CE-6DB70DBA9567}" type="datetimeFigureOut">
               <a:rPr lang="en-US" dirty="0"/>
               <a:pPr/>
-              <a:t>10/29/2018</a:t>
+              <a:t>11/2/2018</a:t>
             </a:fld>
             <a:endParaRPr lang="en-US" dirty="0"/>
           </a:p>
@@ -4652,7 +4657,7 @@
             <a:fld id="{B61BEF0D-F0BB-DE4B-95CE-6DB70DBA9567}" type="datetimeFigureOut">
               <a:rPr lang="en-US" dirty="0"/>
               <a:pPr/>
-              <a:t>10/29/2018</a:t>
+              <a:t>11/2/2018</a:t>
             </a:fld>
             <a:endParaRPr lang="en-US" dirty="0"/>
           </a:p>
@@ -4994,7 +4999,7 @@
             <a:fld id="{B61BEF0D-F0BB-DE4B-95CE-6DB70DBA9567}" type="datetimeFigureOut">
               <a:rPr lang="en-US" dirty="0"/>
               <a:pPr/>
-              <a:t>10/29/2018</a:t>
+              <a:t>11/2/2018</a:t>
             </a:fld>
             <a:endParaRPr lang="en-US" dirty="0"/>
           </a:p>
@@ -7108,7 +7113,7 @@
             <a:fld id="{B61BEF0D-F0BB-DE4B-95CE-6DB70DBA9567}" type="datetimeFigureOut">
               <a:rPr lang="en-US" dirty="0"/>
               <a:pPr/>
-              <a:t>10/29/2018</a:t>
+              <a:t>11/2/2018</a:t>
             </a:fld>
             <a:endParaRPr lang="en-US" dirty="0"/>
           </a:p>
@@ -7981,7 +7986,7 @@
         <p:spPr/>
         <p:txBody>
           <a:bodyPr>
-            <a:normAutofit fontScale="85000" lnSpcReduction="20000"/>
+            <a:normAutofit fontScale="77500" lnSpcReduction="20000"/>
           </a:bodyPr>
           <a:lstStyle/>
           <a:p>
@@ -8035,7 +8040,7 @@
             </a:r>
             <a:r>
               <a:rPr lang="cs-CZ" dirty="0" smtClean="0"/>
-              <a:t>ý sloupec. Vše se může nastivit jak staticky, tak dynamicky. Třída obsahuje metodu na vkládání nových řádků do databáze (kontroluje se typ, atd...). Je možné dodatečně říct, že chci vytvořit index na daném sloupci. Chci umět vyhledávat podle zadaného sloupce (funkce vrátí celý sloupec). Chci umět vypsat všechny hodnoty v daném sloupci. Chci umět procházet celou databázi a zpracovávat řádek po řádku/sloupec po sloupci. Chci vrátit všechny řádky s indexem, který odpovídá nějakému intervalu. Chci umět provádět množinové operace na řádky (průnik, ...). Chci umět říct, jestli daná hodnota existuje v daném sloupci. Chci, aby databáze byla thread-safe (více vláken může přistupovat, vkládat do databáze). </a:t>
+              <a:t>ý sloupec. Vše se může nastivit jak staticky, tak dynamicky. Třída obsahuje metodu na vkládání nových řádků do databáze (kontroluje se typ, atd...). Je možné dodatečně říct, že chci vytvořit index na daném sloupci. Chci umět vyhledávat podle zadaného sloupce (funkce vrátí celý sloupec). Chci umět vypsat všechny hodnoty v daném sloupci. Chci umět procházet celou databázi a zpracovávat řádek po řádku/sloupec po sloupci. Chci vrátit všechny řádky s indexem, který odpovídá nějakému intervalu. Chci umět provádět množinové operace na řádky (průnik, ...). Chci umět říct, jestli daná hodnota existuje v daném sloupci. Chci, aby databáze byla thread-safe (více vláken může přistupovat, vkládat do databáze). Chci umět mazat záznamy, podle klíče, podle jména, atd..</a:t>
             </a:r>
           </a:p>
           <a:p>
@@ -8064,6 +8069,35 @@
               <a:rPr lang="cs-CZ" b="1" dirty="0" smtClean="0"/>
               <a:t>Dnes, do půlnoci poslat mailem</a:t>
             </a:r>
+            <a:endParaRPr lang="en-US" b="1" dirty="0" smtClean="0"/>
+          </a:p>
+          <a:p>
+            <a:pPr lvl="1"/>
+            <a:r>
+              <a:rPr lang="en-US" b="1" dirty="0" smtClean="0"/>
+              <a:t>MIN: </a:t>
+            </a:r>
+            <a:r>
+              <a:rPr lang="en-US" dirty="0" err="1" smtClean="0"/>
+              <a:t>vkl</a:t>
+            </a:r>
+            <a:r>
+              <a:rPr lang="cs-CZ" dirty="0" smtClean="0"/>
+              <a:t>ádání prvku </a:t>
+            </a:r>
+            <a:r>
+              <a:rPr lang="en-US" dirty="0" smtClean="0"/>
+              <a:t>+ </a:t>
+            </a:r>
+            <a:r>
+              <a:rPr lang="en-US" dirty="0" err="1" smtClean="0"/>
+              <a:t>vyps</a:t>
+            </a:r>
+            <a:r>
+              <a:rPr lang="cs-CZ" dirty="0" smtClean="0"/>
+              <a:t>ání celé databáze</a:t>
+            </a:r>
+            <a:endParaRPr lang="cs-CZ" b="1" dirty="0" smtClean="0"/>
           </a:p>
           <a:p>
             <a:r>
@@ -8143,6 +8177,13 @@
   <p:clrMapOvr>
     <a:masterClrMapping/>
   </p:clrMapOvr>
+  <p:timing>
+    <p:tnLst>
+      <p:par>
+        <p:cTn id="1" dur="indefinite" restart="never" nodeType="tmRoot"/>
+      </p:par>
+    </p:tnLst>
+  </p:timing>
 </p:sld>
 </file>
 

</xml_diff>